<commit_message>
pretty much finished presentation
</commit_message>
<xml_diff>
--- a/presentation.pptx
+++ b/presentation.pptx
@@ -34,6 +34,14 @@
     <p:sldId id="282" r:id="rId28"/>
     <p:sldId id="283" r:id="rId29"/>
     <p:sldId id="284" r:id="rId30"/>
+    <p:sldId id="285" r:id="rId31"/>
+    <p:sldId id="286" r:id="rId32"/>
+    <p:sldId id="287" r:id="rId33"/>
+    <p:sldId id="288" r:id="rId34"/>
+    <p:sldId id="289" r:id="rId35"/>
+    <p:sldId id="291" r:id="rId36"/>
+    <p:sldId id="292" r:id="rId37"/>
+    <p:sldId id="290" r:id="rId38"/>
   </p:sldIdLst>
   <p:sldSz cx="12192000" cy="6858000"/>
   <p:notesSz cx="6858000" cy="9144000"/>
@@ -289,7 +297,7 @@
           <a:p>
             <a:fld id="{0864CE99-312F-448F-A766-287C79E9A4F1}" type="datetimeFigureOut">
               <a:rPr lang="en-IL" smtClean="0"/>
-              <a:t>25/06/2023</a:t>
+              <a:t>26/06/2023</a:t>
             </a:fld>
             <a:endParaRPr lang="en-IL"/>
           </a:p>
@@ -489,7 +497,7 @@
           <a:p>
             <a:fld id="{0864CE99-312F-448F-A766-287C79E9A4F1}" type="datetimeFigureOut">
               <a:rPr lang="en-IL" smtClean="0"/>
-              <a:t>25/06/2023</a:t>
+              <a:t>26/06/2023</a:t>
             </a:fld>
             <a:endParaRPr lang="en-IL"/>
           </a:p>
@@ -699,7 +707,7 @@
           <a:p>
             <a:fld id="{0864CE99-312F-448F-A766-287C79E9A4F1}" type="datetimeFigureOut">
               <a:rPr lang="en-IL" smtClean="0"/>
-              <a:t>25/06/2023</a:t>
+              <a:t>26/06/2023</a:t>
             </a:fld>
             <a:endParaRPr lang="en-IL"/>
           </a:p>
@@ -899,7 +907,7 @@
           <a:p>
             <a:fld id="{0864CE99-312F-448F-A766-287C79E9A4F1}" type="datetimeFigureOut">
               <a:rPr lang="en-IL" smtClean="0"/>
-              <a:t>25/06/2023</a:t>
+              <a:t>26/06/2023</a:t>
             </a:fld>
             <a:endParaRPr lang="en-IL"/>
           </a:p>
@@ -1175,7 +1183,7 @@
           <a:p>
             <a:fld id="{0864CE99-312F-448F-A766-287C79E9A4F1}" type="datetimeFigureOut">
               <a:rPr lang="en-IL" smtClean="0"/>
-              <a:t>25/06/2023</a:t>
+              <a:t>26/06/2023</a:t>
             </a:fld>
             <a:endParaRPr lang="en-IL"/>
           </a:p>
@@ -1443,7 +1451,7 @@
           <a:p>
             <a:fld id="{0864CE99-312F-448F-A766-287C79E9A4F1}" type="datetimeFigureOut">
               <a:rPr lang="en-IL" smtClean="0"/>
-              <a:t>25/06/2023</a:t>
+              <a:t>26/06/2023</a:t>
             </a:fld>
             <a:endParaRPr lang="en-IL"/>
           </a:p>
@@ -1858,7 +1866,7 @@
           <a:p>
             <a:fld id="{0864CE99-312F-448F-A766-287C79E9A4F1}" type="datetimeFigureOut">
               <a:rPr lang="en-IL" smtClean="0"/>
-              <a:t>25/06/2023</a:t>
+              <a:t>26/06/2023</a:t>
             </a:fld>
             <a:endParaRPr lang="en-IL"/>
           </a:p>
@@ -2000,7 +2008,7 @@
           <a:p>
             <a:fld id="{0864CE99-312F-448F-A766-287C79E9A4F1}" type="datetimeFigureOut">
               <a:rPr lang="en-IL" smtClean="0"/>
-              <a:t>25/06/2023</a:t>
+              <a:t>26/06/2023</a:t>
             </a:fld>
             <a:endParaRPr lang="en-IL"/>
           </a:p>
@@ -2113,7 +2121,7 @@
           <a:p>
             <a:fld id="{0864CE99-312F-448F-A766-287C79E9A4F1}" type="datetimeFigureOut">
               <a:rPr lang="en-IL" smtClean="0"/>
-              <a:t>25/06/2023</a:t>
+              <a:t>26/06/2023</a:t>
             </a:fld>
             <a:endParaRPr lang="en-IL"/>
           </a:p>
@@ -2426,7 +2434,7 @@
           <a:p>
             <a:fld id="{0864CE99-312F-448F-A766-287C79E9A4F1}" type="datetimeFigureOut">
               <a:rPr lang="en-IL" smtClean="0"/>
-              <a:t>25/06/2023</a:t>
+              <a:t>26/06/2023</a:t>
             </a:fld>
             <a:endParaRPr lang="en-IL"/>
           </a:p>
@@ -2715,7 +2723,7 @@
           <a:p>
             <a:fld id="{0864CE99-312F-448F-A766-287C79E9A4F1}" type="datetimeFigureOut">
               <a:rPr lang="en-IL" smtClean="0"/>
-              <a:t>25/06/2023</a:t>
+              <a:t>26/06/2023</a:t>
             </a:fld>
             <a:endParaRPr lang="en-IL"/>
           </a:p>
@@ -2958,7 +2966,7 @@
           <a:p>
             <a:fld id="{0864CE99-312F-448F-A766-287C79E9A4F1}" type="datetimeFigureOut">
               <a:rPr lang="en-IL" smtClean="0"/>
-              <a:t>25/06/2023</a:t>
+              <a:t>26/06/2023</a:t>
             </a:fld>
             <a:endParaRPr lang="en-IL"/>
           </a:p>
@@ -4583,13 +4591,7 @@
                             <a:rPr lang="en-US" b="0" i="1" smtClean="0">
                               <a:latin typeface="Cambria Math" panose="02040503050406030204" pitchFamily="18" charset="0"/>
                             </a:rPr>
-                            <m:t>+</m:t>
-                          </m:r>
-                          <m:r>
-                            <a:rPr lang="en-US" b="0" i="1" smtClean="0">
-                              <a:latin typeface="Cambria Math" panose="02040503050406030204" pitchFamily="18" charset="0"/>
-                            </a:rPr>
-                            <m:t>1</m:t>
+                            <m:t>+1</m:t>
                           </m:r>
                         </m:sup>
                       </m:sSup>
@@ -4685,13 +4687,7 @@
                             <a:rPr lang="en-US" b="0" i="1" smtClean="0">
                               <a:latin typeface="Cambria Math" panose="02040503050406030204" pitchFamily="18" charset="0"/>
                             </a:rPr>
-                            <m:t>1</m:t>
-                          </m:r>
-                          <m:r>
-                            <a:rPr lang="en-US" b="0" i="1" smtClean="0">
-                              <a:latin typeface="Cambria Math" panose="02040503050406030204" pitchFamily="18" charset="0"/>
-                            </a:rPr>
-                            <m:t>−</m:t>
+                            <m:t>1−</m:t>
                           </m:r>
                           <m:sSub>
                             <m:sSubPr>
@@ -5113,13 +5109,7 @@
                             <a:rPr lang="en-US" b="0" i="1" smtClean="0">
                               <a:latin typeface="Cambria Math" panose="02040503050406030204" pitchFamily="18" charset="0"/>
                             </a:rPr>
-                            <m:t>−</m:t>
-                          </m:r>
-                          <m:r>
-                            <a:rPr lang="en-US" b="0" i="1" smtClean="0">
-                              <a:latin typeface="Cambria Math" panose="02040503050406030204" pitchFamily="18" charset="0"/>
-                            </a:rPr>
-                            <m:t>2</m:t>
+                            <m:t>−2</m:t>
                           </m:r>
                           <m:sSup>
                             <m:sSupPr>
@@ -5163,19 +5153,7 @@
                                         <a:rPr lang="en-US" b="0" i="1" smtClean="0">
                                           <a:latin typeface="Cambria Math" panose="02040503050406030204" pitchFamily="18" charset="0"/>
                                         </a:rPr>
-                                        <m:t>0</m:t>
-                                      </m:r>
-                                      <m:r>
-                                        <a:rPr lang="en-US" b="0" i="1" smtClean="0">
-                                          <a:latin typeface="Cambria Math" panose="02040503050406030204" pitchFamily="18" charset="0"/>
-                                        </a:rPr>
-                                        <m:t>.</m:t>
-                                      </m:r>
-                                      <m:r>
-                                        <a:rPr lang="en-US" b="0" i="1" smtClean="0">
-                                          <a:latin typeface="Cambria Math" panose="02040503050406030204" pitchFamily="18" charset="0"/>
-                                        </a:rPr>
-                                        <m:t>5</m:t>
+                                        <m:t>0.5</m:t>
                                       </m:r>
                                     </m:sup>
                                   </m:sSup>
@@ -5209,19 +5187,7 @@
                                         <a:rPr lang="en-US" b="0" i="1" smtClean="0">
                                           <a:latin typeface="Cambria Math" panose="02040503050406030204" pitchFamily="18" charset="0"/>
                                         </a:rPr>
-                                        <m:t>0</m:t>
-                                      </m:r>
-                                      <m:r>
-                                        <a:rPr lang="en-US" b="0" i="1" smtClean="0">
-                                          <a:latin typeface="Cambria Math" panose="02040503050406030204" pitchFamily="18" charset="0"/>
-                                        </a:rPr>
-                                        <m:t>.</m:t>
-                                      </m:r>
-                                      <m:r>
-                                        <a:rPr lang="en-US" b="0" i="1" smtClean="0">
-                                          <a:latin typeface="Cambria Math" panose="02040503050406030204" pitchFamily="18" charset="0"/>
-                                        </a:rPr>
-                                        <m:t>5</m:t>
+                                        <m:t>0.5</m:t>
                                       </m:r>
                                     </m:sup>
                                   </m:sSup>
@@ -5233,19 +5199,7 @@
                                 <a:rPr lang="en-US" b="0" i="1" smtClean="0">
                                   <a:latin typeface="Cambria Math" panose="02040503050406030204" pitchFamily="18" charset="0"/>
                                 </a:rPr>
-                                <m:t>0</m:t>
-                              </m:r>
-                              <m:r>
-                                <a:rPr lang="en-US" b="0" i="1" smtClean="0">
-                                  <a:latin typeface="Cambria Math" panose="02040503050406030204" pitchFamily="18" charset="0"/>
-                                </a:rPr>
-                                <m:t>.</m:t>
-                              </m:r>
-                              <m:r>
-                                <a:rPr lang="en-US" b="0" i="1" smtClean="0">
-                                  <a:latin typeface="Cambria Math" panose="02040503050406030204" pitchFamily="18" charset="0"/>
-                                </a:rPr>
-                                <m:t>5</m:t>
+                                <m:t>0.5</m:t>
                               </m:r>
                             </m:sup>
                           </m:sSup>
@@ -8049,13 +8003,7 @@
                                 <a:rPr lang="en-US" b="0" i="1" smtClean="0">
                                   <a:latin typeface="Cambria Math" panose="02040503050406030204" pitchFamily="18" charset="0"/>
                                 </a:rPr>
-                                <m:t>−</m:t>
-                              </m:r>
-                              <m:r>
-                                <a:rPr lang="en-US" b="0" i="1" smtClean="0">
-                                  <a:latin typeface="Cambria Math" panose="02040503050406030204" pitchFamily="18" charset="0"/>
-                                </a:rPr>
-                                <m:t>1</m:t>
+                                <m:t>−1</m:t>
                               </m:r>
                             </m:sub>
                           </m:sSub>
@@ -8237,13 +8185,7 @@
                                 <a:rPr lang="en-US" b="0" i="1" smtClean="0">
                                   <a:latin typeface="Cambria Math" panose="02040503050406030204" pitchFamily="18" charset="0"/>
                                 </a:rPr>
-                                <m:t>−</m:t>
-                              </m:r>
-                              <m:r>
-                                <a:rPr lang="en-US" b="0" i="1" smtClean="0">
-                                  <a:latin typeface="Cambria Math" panose="02040503050406030204" pitchFamily="18" charset="0"/>
-                                </a:rPr>
-                                <m:t>1</m:t>
+                                <m:t>−1</m:t>
                               </m:r>
                             </m:sub>
                           </m:sSub>
@@ -9090,8 +9032,8 @@
           </a:p>
         </p:txBody>
       </p:sp>
-      <mc:AlternateContent xmlns:mc="http://schemas.openxmlformats.org/markup-compatibility/2006">
-        <mc:Choice xmlns:a14="http://schemas.microsoft.com/office/drawing/2010/main" Requires="a14">
+      <mc:AlternateContent xmlns:mc="http://schemas.openxmlformats.org/markup-compatibility/2006" xmlns:a14="http://schemas.microsoft.com/office/drawing/2010/main">
+        <mc:Choice Requires="a14">
           <p:sp>
             <p:nvSpPr>
               <p:cNvPr id="3" name="Content Placeholder 2">
@@ -9992,7 +9934,7 @@
             </p:txBody>
           </p:sp>
         </mc:Choice>
-        <mc:Fallback>
+        <mc:Fallback xmlns="">
           <p:sp>
             <p:nvSpPr>
               <p:cNvPr id="3" name="Content Placeholder 2">
@@ -10219,8 +10161,8 @@
           </a:p>
         </p:txBody>
       </p:sp>
-      <mc:AlternateContent xmlns:mc="http://schemas.openxmlformats.org/markup-compatibility/2006">
-        <mc:Choice xmlns:a14="http://schemas.microsoft.com/office/drawing/2010/main" Requires="a14">
+      <mc:AlternateContent xmlns:mc="http://schemas.openxmlformats.org/markup-compatibility/2006" xmlns:a14="http://schemas.microsoft.com/office/drawing/2010/main">
+        <mc:Choice Requires="a14">
           <p:sp>
             <p:nvSpPr>
               <p:cNvPr id="3" name="Content Placeholder 2">
@@ -11208,7 +11150,7 @@
             </p:txBody>
           </p:sp>
         </mc:Choice>
-        <mc:Fallback>
+        <mc:Fallback xmlns="">
           <p:sp>
             <p:nvSpPr>
               <p:cNvPr id="3" name="Content Placeholder 2">
@@ -11540,8 +11482,8 @@
           </a:p>
         </p:txBody>
       </p:sp>
-      <mc:AlternateContent xmlns:mc="http://schemas.openxmlformats.org/markup-compatibility/2006">
-        <mc:Choice xmlns:a14="http://schemas.microsoft.com/office/drawing/2010/main" Requires="a14">
+      <mc:AlternateContent xmlns:mc="http://schemas.openxmlformats.org/markup-compatibility/2006" xmlns:a14="http://schemas.microsoft.com/office/drawing/2010/main">
+        <mc:Choice Requires="a14">
           <p:sp>
             <p:nvSpPr>
               <p:cNvPr id="3" name="Content Placeholder 2">
@@ -11576,19 +11518,7 @@
                       <a:rPr lang="en-US" i="1" dirty="0" smtClean="0">
                         <a:latin typeface="Cambria Math" panose="02040503050406030204" pitchFamily="18" charset="0"/>
                       </a:rPr>
-                      <m:t>𝑡</m:t>
-                    </m:r>
-                    <m:r>
-                      <a:rPr lang="en-US" i="1" dirty="0" smtClean="0">
-                        <a:latin typeface="Cambria Math" panose="02040503050406030204" pitchFamily="18" charset="0"/>
-                      </a:rPr>
-                      <m:t>h</m:t>
-                    </m:r>
-                    <m:r>
-                      <a:rPr lang="en-US" i="1" dirty="0" smtClean="0">
-                        <a:latin typeface="Cambria Math" panose="02040503050406030204" pitchFamily="18" charset="0"/>
-                      </a:rPr>
-                      <m:t>𝑎𝑡</m:t>
+                      <m:t>𝑡h𝑎𝑡</m:t>
                     </m:r>
                     <m:r>
                       <a:rPr lang="en-US" i="1" dirty="0" smtClean="0">
@@ -11671,13 +11601,7 @@
                               <a:rPr lang="en-US" i="1" dirty="0">
                                 <a:latin typeface="Cambria Math" panose="02040503050406030204" pitchFamily="18" charset="0"/>
                               </a:rPr>
-                              <m:t>−</m:t>
-                            </m:r>
-                            <m:r>
-                              <a:rPr lang="en-US" i="1" dirty="0">
-                                <a:latin typeface="Cambria Math" panose="02040503050406030204" pitchFamily="18" charset="0"/>
-                              </a:rPr>
-                              <m:t>1</m:t>
+                              <m:t>−1</m:t>
                             </m:r>
                           </m:sub>
                         </m:sSub>
@@ -11972,13 +11896,7 @@
                             <a:rPr lang="en-US" b="0" i="1" smtClean="0">
                               <a:latin typeface="Cambria Math" panose="02040503050406030204" pitchFamily="18" charset="0"/>
                             </a:rPr>
-                            <m:t>−</m:t>
-                          </m:r>
-                          <m:r>
-                            <a:rPr lang="en-US" b="0" i="1" smtClean="0">
-                              <a:latin typeface="Cambria Math" panose="02040503050406030204" pitchFamily="18" charset="0"/>
-                            </a:rPr>
-                            <m:t>1</m:t>
+                            <m:t>−1</m:t>
                           </m:r>
                         </m:sub>
                       </m:sSub>
@@ -12146,13 +12064,7 @@
                             <a:rPr lang="en-US" b="0" i="1" smtClean="0">
                               <a:latin typeface="Cambria Math" panose="02040503050406030204" pitchFamily="18" charset="0"/>
                             </a:rPr>
-                            <m:t>−</m:t>
-                          </m:r>
-                          <m:r>
-                            <a:rPr lang="en-US" b="0" i="1" smtClean="0">
-                              <a:latin typeface="Cambria Math" panose="02040503050406030204" pitchFamily="18" charset="0"/>
-                            </a:rPr>
-                            <m:t>1</m:t>
+                            <m:t>−1</m:t>
                           </m:r>
                         </m:sub>
                       </m:sSub>
@@ -12573,7 +12485,7 @@
             </p:txBody>
           </p:sp>
         </mc:Choice>
-        <mc:Fallback>
+        <mc:Fallback xmlns="">
           <p:sp>
             <p:nvSpPr>
               <p:cNvPr id="3" name="Content Placeholder 2">
@@ -12672,8 +12584,8 @@
           </a:p>
         </p:txBody>
       </p:sp>
-      <mc:AlternateContent xmlns:mc="http://schemas.openxmlformats.org/markup-compatibility/2006">
-        <mc:Choice xmlns:a14="http://schemas.microsoft.com/office/drawing/2010/main" Requires="a14">
+      <mc:AlternateContent xmlns:mc="http://schemas.openxmlformats.org/markup-compatibility/2006" xmlns:a14="http://schemas.microsoft.com/office/drawing/2010/main">
+        <mc:Choice Requires="a14">
           <p:sp>
             <p:nvSpPr>
               <p:cNvPr id="3" name="Content Placeholder 2">
@@ -13621,7 +13533,7 @@
             </p:txBody>
           </p:sp>
         </mc:Choice>
-        <mc:Fallback>
+        <mc:Fallback xmlns="">
           <p:sp>
             <p:nvSpPr>
               <p:cNvPr id="3" name="Content Placeholder 2">
@@ -13720,8 +13632,8 @@
           </a:p>
         </p:txBody>
       </p:sp>
-      <mc:AlternateContent xmlns:mc="http://schemas.openxmlformats.org/markup-compatibility/2006">
-        <mc:Choice xmlns:a14="http://schemas.microsoft.com/office/drawing/2010/main" Requires="a14">
+      <mc:AlternateContent xmlns:mc="http://schemas.openxmlformats.org/markup-compatibility/2006" xmlns:a14="http://schemas.microsoft.com/office/drawing/2010/main">
+        <mc:Choice Requires="a14">
           <p:sp>
             <p:nvSpPr>
               <p:cNvPr id="3" name="Content Placeholder 2">
@@ -14135,13 +14047,7 @@
                             <a:rPr lang="en-US" b="0" i="1" dirty="0" smtClean="0">
                               <a:latin typeface="Cambria Math" panose="02040503050406030204" pitchFamily="18" charset="0"/>
                             </a:rPr>
-                            <m:t>−</m:t>
-                          </m:r>
-                          <m:r>
-                            <a:rPr lang="en-US" b="0" i="1" dirty="0" smtClean="0">
-                              <a:latin typeface="Cambria Math" panose="02040503050406030204" pitchFamily="18" charset="0"/>
-                            </a:rPr>
-                            <m:t>1</m:t>
+                            <m:t>−1</m:t>
                           </m:r>
                         </m:sup>
                       </m:sSup>
@@ -14472,13 +14378,7 @@
                             <a:rPr lang="en-US" b="0" i="1" smtClean="0">
                               <a:latin typeface="Cambria Math" panose="02040503050406030204" pitchFamily="18" charset="0"/>
                             </a:rPr>
-                            <m:t>−</m:t>
-                          </m:r>
-                          <m:r>
-                            <a:rPr lang="en-US" b="0" i="1" smtClean="0">
-                              <a:latin typeface="Cambria Math" panose="02040503050406030204" pitchFamily="18" charset="0"/>
-                            </a:rPr>
-                            <m:t>1</m:t>
+                            <m:t>−1</m:t>
                           </m:r>
                         </m:sup>
                       </m:sSup>
@@ -14535,7 +14435,7 @@
             </p:txBody>
           </p:sp>
         </mc:Choice>
-        <mc:Fallback>
+        <mc:Fallback xmlns="">
           <p:sp>
             <p:nvSpPr>
               <p:cNvPr id="3" name="Content Placeholder 2">
@@ -15247,6 +15147,961 @@
     <p:extLst>
       <p:ext uri="{BB962C8B-B14F-4D97-AF65-F5344CB8AC3E}">
         <p14:creationId xmlns:p14="http://schemas.microsoft.com/office/powerpoint/2010/main" val="1191010430"/>
+      </p:ext>
+    </p:extLst>
+  </p:cSld>
+  <p:clrMapOvr>
+    <a:masterClrMapping/>
+  </p:clrMapOvr>
+</p:sld>
+</file>
+
+<file path=ppt/slides/slide30.xml><?xml version="1.0" encoding="utf-8"?>
+<p:sld xmlns:a="http://schemas.openxmlformats.org/drawingml/2006/main" xmlns:r="http://schemas.openxmlformats.org/officeDocument/2006/relationships" xmlns:p="http://schemas.openxmlformats.org/presentationml/2006/main">
+  <p:cSld>
+    <p:spTree>
+      <p:nvGrpSpPr>
+        <p:cNvPr id="1" name=""/>
+        <p:cNvGrpSpPr/>
+        <p:nvPr/>
+      </p:nvGrpSpPr>
+      <p:grpSpPr>
+        <a:xfrm>
+          <a:off x="0" y="0"/>
+          <a:ext cx="0" cy="0"/>
+          <a:chOff x="0" y="0"/>
+          <a:chExt cx="0" cy="0"/>
+        </a:xfrm>
+      </p:grpSpPr>
+      <p:sp>
+        <p:nvSpPr>
+          <p:cNvPr id="2" name="Title 1">
+            <a:extLst>
+              <a:ext uri="{FF2B5EF4-FFF2-40B4-BE49-F238E27FC236}">
+                <a16:creationId xmlns:a16="http://schemas.microsoft.com/office/drawing/2014/main" id="{072A9A29-BAF5-2BFE-7A6A-C6FF0BBCB802}"/>
+              </a:ext>
+            </a:extLst>
+          </p:cNvPr>
+          <p:cNvSpPr>
+            <a:spLocks noGrp="1"/>
+          </p:cNvSpPr>
+          <p:nvPr>
+            <p:ph type="ctrTitle"/>
+          </p:nvPr>
+        </p:nvSpPr>
+        <p:spPr/>
+        <p:txBody>
+          <a:bodyPr/>
+          <a:lstStyle/>
+          <a:p>
+            <a:r>
+              <a:rPr lang="en-US" dirty="0"/>
+              <a:t>Connected literature</a:t>
+            </a:r>
+            <a:endParaRPr lang="en-IL" dirty="0"/>
+          </a:p>
+        </p:txBody>
+      </p:sp>
+      <p:sp>
+        <p:nvSpPr>
+          <p:cNvPr id="3" name="Subtitle 2">
+            <a:extLst>
+              <a:ext uri="{FF2B5EF4-FFF2-40B4-BE49-F238E27FC236}">
+                <a16:creationId xmlns:a16="http://schemas.microsoft.com/office/drawing/2014/main" id="{D30B3B42-05DD-B4D4-A43A-F4C71B0D9992}"/>
+              </a:ext>
+            </a:extLst>
+          </p:cNvPr>
+          <p:cNvSpPr>
+            <a:spLocks noGrp="1"/>
+          </p:cNvSpPr>
+          <p:nvPr>
+            <p:ph type="subTitle" idx="1"/>
+          </p:nvPr>
+        </p:nvSpPr>
+        <p:spPr/>
+        <p:txBody>
+          <a:bodyPr/>
+          <a:lstStyle/>
+          <a:p>
+            <a:endParaRPr lang="en-IL"/>
+          </a:p>
+        </p:txBody>
+      </p:sp>
+    </p:spTree>
+    <p:extLst>
+      <p:ext uri="{BB962C8B-B14F-4D97-AF65-F5344CB8AC3E}">
+        <p14:creationId xmlns:p14="http://schemas.microsoft.com/office/powerpoint/2010/main" val="1768391373"/>
+      </p:ext>
+    </p:extLst>
+  </p:cSld>
+  <p:clrMapOvr>
+    <a:masterClrMapping/>
+  </p:clrMapOvr>
+</p:sld>
+</file>
+
+<file path=ppt/slides/slide31.xml><?xml version="1.0" encoding="utf-8"?>
+<p:sld xmlns:a="http://schemas.openxmlformats.org/drawingml/2006/main" xmlns:r="http://schemas.openxmlformats.org/officeDocument/2006/relationships" xmlns:p="http://schemas.openxmlformats.org/presentationml/2006/main">
+  <p:cSld>
+    <p:spTree>
+      <p:nvGrpSpPr>
+        <p:cNvPr id="1" name=""/>
+        <p:cNvGrpSpPr/>
+        <p:nvPr/>
+      </p:nvGrpSpPr>
+      <p:grpSpPr>
+        <a:xfrm>
+          <a:off x="0" y="0"/>
+          <a:ext cx="0" cy="0"/>
+          <a:chOff x="0" y="0"/>
+          <a:chExt cx="0" cy="0"/>
+        </a:xfrm>
+      </p:grpSpPr>
+      <p:sp>
+        <p:nvSpPr>
+          <p:cNvPr id="2" name="Title 1">
+            <a:extLst>
+              <a:ext uri="{FF2B5EF4-FFF2-40B4-BE49-F238E27FC236}">
+                <a16:creationId xmlns:a16="http://schemas.microsoft.com/office/drawing/2014/main" id="{D265DBC4-9C63-6BDA-C617-AA49862DC3BE}"/>
+              </a:ext>
+            </a:extLst>
+          </p:cNvPr>
+          <p:cNvSpPr>
+            <a:spLocks noGrp="1"/>
+          </p:cNvSpPr>
+          <p:nvPr>
+            <p:ph type="title"/>
+          </p:nvPr>
+        </p:nvSpPr>
+        <p:spPr/>
+        <p:txBody>
+          <a:bodyPr/>
+          <a:lstStyle/>
+          <a:p>
+            <a:r>
+              <a:rPr lang="en-US" dirty="0"/>
+              <a:t>Connected literature</a:t>
+            </a:r>
+            <a:endParaRPr lang="en-IL" dirty="0"/>
+          </a:p>
+        </p:txBody>
+      </p:sp>
+      <mc:AlternateContent xmlns:mc="http://schemas.openxmlformats.org/markup-compatibility/2006">
+        <mc:Choice xmlns:a14="http://schemas.microsoft.com/office/drawing/2010/main" Requires="a14">
+          <p:sp>
+            <p:nvSpPr>
+              <p:cNvPr id="3" name="Content Placeholder 2">
+                <a:extLst>
+                  <a:ext uri="{FF2B5EF4-FFF2-40B4-BE49-F238E27FC236}">
+                    <a16:creationId xmlns:a16="http://schemas.microsoft.com/office/drawing/2014/main" id="{ECA8C94C-A6DD-52A5-D0E5-36D6CC5F0A43}"/>
+                  </a:ext>
+                </a:extLst>
+              </p:cNvPr>
+              <p:cNvSpPr>
+                <a:spLocks noGrp="1"/>
+              </p:cNvSpPr>
+              <p:nvPr>
+                <p:ph idx="1"/>
+              </p:nvPr>
+            </p:nvSpPr>
+            <p:spPr/>
+            <p:txBody>
+              <a:bodyPr/>
+              <a:lstStyle/>
+              <a:p>
+                <a:pPr marL="0" indent="0">
+                  <a:buNone/>
+                </a:pPr>
+                <a:r>
+                  <a:rPr lang="en-US" dirty="0"/>
+                  <a:t>The </a:t>
+                </a:r>
+                <a14:m>
+                  <m:oMath xmlns:m="http://schemas.openxmlformats.org/officeDocument/2006/math">
+                    <m:sSub>
+                      <m:sSubPr>
+                        <m:ctrlPr>
+                          <a:rPr lang="en-US" b="0" i="1" smtClean="0">
+                            <a:latin typeface="Cambria Math" panose="02040503050406030204" pitchFamily="18" charset="0"/>
+                          </a:rPr>
+                        </m:ctrlPr>
+                      </m:sSubPr>
+                      <m:e>
+                        <m:r>
+                          <a:rPr lang="en-US" b="0" i="1" smtClean="0">
+                            <a:latin typeface="Cambria Math" panose="02040503050406030204" pitchFamily="18" charset="0"/>
+                          </a:rPr>
+                          <m:t>ℋ</m:t>
+                        </m:r>
+                      </m:e>
+                      <m:sub>
+                        <m:r>
+                          <a:rPr lang="en-US" b="0" i="1" smtClean="0">
+                            <a:latin typeface="Cambria Math" panose="02040503050406030204" pitchFamily="18" charset="0"/>
+                          </a:rPr>
+                          <m:t>∞</m:t>
+                        </m:r>
+                      </m:sub>
+                    </m:sSub>
+                  </m:oMath>
+                </a14:m>
+                <a:r>
+                  <a:rPr lang="en-US" dirty="0"/>
+                  <a:t> filter also targets  situations in which the statistics of the noise process is uncertain and where one aims to minimize the worst case.</a:t>
+                </a:r>
+              </a:p>
+              <a:p>
+                <a:pPr marL="0" indent="0">
+                  <a:buNone/>
+                </a:pPr>
+                <a:endParaRPr lang="en-US" dirty="0"/>
+              </a:p>
+              <a:p>
+                <a:pPr marL="0" indent="0">
+                  <a:buNone/>
+                </a:pPr>
+                <a:r>
+                  <a:rPr lang="en-US" dirty="0"/>
+                  <a:t>However, in transient operation, the desired </a:t>
+                </a:r>
+                <a14:m>
+                  <m:oMath xmlns:m="http://schemas.openxmlformats.org/officeDocument/2006/math">
+                    <m:sSub>
+                      <m:sSubPr>
+                        <m:ctrlPr>
+                          <a:rPr lang="en-US" b="0" i="1" smtClean="0">
+                            <a:latin typeface="Cambria Math" panose="02040503050406030204" pitchFamily="18" charset="0"/>
+                          </a:rPr>
+                        </m:ctrlPr>
+                      </m:sSubPr>
+                      <m:e>
+                        <m:r>
+                          <a:rPr lang="en-US" b="0" i="1" smtClean="0">
+                            <a:latin typeface="Cambria Math" panose="02040503050406030204" pitchFamily="18" charset="0"/>
+                          </a:rPr>
+                          <m:t>ℋ</m:t>
+                        </m:r>
+                      </m:e>
+                      <m:sub>
+                        <m:r>
+                          <a:rPr lang="en-US" b="0" i="1" smtClean="0">
+                            <a:latin typeface="Cambria Math" panose="02040503050406030204" pitchFamily="18" charset="0"/>
+                          </a:rPr>
+                          <m:t>∞</m:t>
+                        </m:r>
+                      </m:sub>
+                    </m:sSub>
+                  </m:oMath>
+                </a14:m>
+                <a:r>
+                  <a:rPr lang="en-US" dirty="0"/>
+                  <a:t>-performance is lost, and the filter may diverge unless some (typically restrictive) positivity condition holds in each iteration.</a:t>
+                </a:r>
+                <a:endParaRPr lang="en-IL" dirty="0"/>
+              </a:p>
+            </p:txBody>
+          </p:sp>
+        </mc:Choice>
+        <mc:Fallback>
+          <p:sp>
+            <p:nvSpPr>
+              <p:cNvPr id="3" name="Content Placeholder 2">
+                <a:extLst>
+                  <a:ext uri="{FF2B5EF4-FFF2-40B4-BE49-F238E27FC236}">
+                    <a16:creationId xmlns:a16="http://schemas.microsoft.com/office/drawing/2014/main" id="{ECA8C94C-A6DD-52A5-D0E5-36D6CC5F0A43}"/>
+                  </a:ext>
+                </a:extLst>
+              </p:cNvPr>
+              <p:cNvSpPr>
+                <a:spLocks noGrp="1" noRot="1" noChangeAspect="1" noMove="1" noResize="1" noEditPoints="1" noAdjustHandles="1" noChangeArrowheads="1" noChangeShapeType="1" noTextEdit="1"/>
+              </p:cNvSpPr>
+              <p:nvPr>
+                <p:ph idx="1"/>
+              </p:nvPr>
+            </p:nvSpPr>
+            <p:spPr>
+              <a:blipFill>
+                <a:blip r:embed="rId2"/>
+                <a:stretch>
+                  <a:fillRect l="-1217" t="-2241" r="-928"/>
+                </a:stretch>
+              </a:blipFill>
+            </p:spPr>
+            <p:txBody>
+              <a:bodyPr/>
+              <a:lstStyle/>
+              <a:p>
+                <a:r>
+                  <a:rPr lang="en-IL">
+                    <a:noFill/>
+                  </a:rPr>
+                  <a:t> </a:t>
+                </a:r>
+              </a:p>
+            </p:txBody>
+          </p:sp>
+        </mc:Fallback>
+      </mc:AlternateContent>
+    </p:spTree>
+    <p:extLst>
+      <p:ext uri="{BB962C8B-B14F-4D97-AF65-F5344CB8AC3E}">
+        <p14:creationId xmlns:p14="http://schemas.microsoft.com/office/powerpoint/2010/main" val="1127630578"/>
+      </p:ext>
+    </p:extLst>
+  </p:cSld>
+  <p:clrMapOvr>
+    <a:masterClrMapping/>
+  </p:clrMapOvr>
+</p:sld>
+</file>
+
+<file path=ppt/slides/slide32.xml><?xml version="1.0" encoding="utf-8"?>
+<p:sld xmlns:a="http://schemas.openxmlformats.org/drawingml/2006/main" xmlns:r="http://schemas.openxmlformats.org/officeDocument/2006/relationships" xmlns:p="http://schemas.openxmlformats.org/presentationml/2006/main">
+  <p:cSld>
+    <p:spTree>
+      <p:nvGrpSpPr>
+        <p:cNvPr id="1" name=""/>
+        <p:cNvGrpSpPr/>
+        <p:nvPr/>
+      </p:nvGrpSpPr>
+      <p:grpSpPr>
+        <a:xfrm>
+          <a:off x="0" y="0"/>
+          <a:ext cx="0" cy="0"/>
+          <a:chOff x="0" y="0"/>
+          <a:chExt cx="0" cy="0"/>
+        </a:xfrm>
+      </p:grpSpPr>
+      <p:sp>
+        <p:nvSpPr>
+          <p:cNvPr id="2" name="Title 1">
+            <a:extLst>
+              <a:ext uri="{FF2B5EF4-FFF2-40B4-BE49-F238E27FC236}">
+                <a16:creationId xmlns:a16="http://schemas.microsoft.com/office/drawing/2014/main" id="{EF8B5EBE-8F6C-844D-58A5-C523BB75E204}"/>
+              </a:ext>
+            </a:extLst>
+          </p:cNvPr>
+          <p:cNvSpPr>
+            <a:spLocks noGrp="1"/>
+          </p:cNvSpPr>
+          <p:nvPr>
+            <p:ph type="title"/>
+          </p:nvPr>
+        </p:nvSpPr>
+        <p:spPr/>
+        <p:txBody>
+          <a:bodyPr/>
+          <a:lstStyle/>
+          <a:p>
+            <a:r>
+              <a:rPr lang="en-US" dirty="0"/>
+              <a:t>Connected literature</a:t>
+            </a:r>
+            <a:endParaRPr lang="en-IL" dirty="0"/>
+          </a:p>
+        </p:txBody>
+      </p:sp>
+      <p:sp>
+        <p:nvSpPr>
+          <p:cNvPr id="3" name="Content Placeholder 2">
+            <a:extLst>
+              <a:ext uri="{FF2B5EF4-FFF2-40B4-BE49-F238E27FC236}">
+                <a16:creationId xmlns:a16="http://schemas.microsoft.com/office/drawing/2014/main" id="{84DBCF78-F379-85CE-FDB5-8E8467ACAC61}"/>
+              </a:ext>
+            </a:extLst>
+          </p:cNvPr>
+          <p:cNvSpPr>
+            <a:spLocks noGrp="1"/>
+          </p:cNvSpPr>
+          <p:nvPr>
+            <p:ph idx="1"/>
+          </p:nvPr>
+        </p:nvSpPr>
+        <p:spPr/>
+        <p:txBody>
+          <a:bodyPr/>
+          <a:lstStyle/>
+          <a:p>
+            <a:pPr marL="0" indent="0">
+              <a:buNone/>
+            </a:pPr>
+            <a:r>
+              <a:rPr lang="en-US" dirty="0"/>
+              <a:t>A risk-sensitive Kalman filter is obtained by minimizing the moment-generating function instead of the mean of the squared estimation error.</a:t>
+            </a:r>
+          </a:p>
+          <a:p>
+            <a:pPr marL="0" indent="0">
+              <a:buNone/>
+            </a:pPr>
+            <a:r>
+              <a:rPr lang="en-US" dirty="0"/>
+              <a:t>This risk-sensitive Kalman filter minimizes the worst-case mean square error across all joint state-output distributions in a </a:t>
+            </a:r>
+            <a:r>
+              <a:rPr lang="en-US" dirty="0" err="1"/>
+              <a:t>Kullback-Leibler</a:t>
+            </a:r>
+            <a:r>
+              <a:rPr lang="en-US" dirty="0"/>
+              <a:t> (KL) ball around a nominal distribution.</a:t>
+            </a:r>
+            <a:endParaRPr lang="en-IL" dirty="0"/>
+          </a:p>
+        </p:txBody>
+      </p:sp>
+    </p:spTree>
+    <p:extLst>
+      <p:ext uri="{BB962C8B-B14F-4D97-AF65-F5344CB8AC3E}">
+        <p14:creationId xmlns:p14="http://schemas.microsoft.com/office/powerpoint/2010/main" val="2636481967"/>
+      </p:ext>
+    </p:extLst>
+  </p:cSld>
+  <p:clrMapOvr>
+    <a:masterClrMapping/>
+  </p:clrMapOvr>
+</p:sld>
+</file>
+
+<file path=ppt/slides/slide33.xml><?xml version="1.0" encoding="utf-8"?>
+<p:sld xmlns:a="http://schemas.openxmlformats.org/drawingml/2006/main" xmlns:r="http://schemas.openxmlformats.org/officeDocument/2006/relationships" xmlns:p="http://schemas.openxmlformats.org/presentationml/2006/main">
+  <p:cSld>
+    <p:spTree>
+      <p:nvGrpSpPr>
+        <p:cNvPr id="1" name=""/>
+        <p:cNvGrpSpPr/>
+        <p:nvPr/>
+      </p:nvGrpSpPr>
+      <p:grpSpPr>
+        <a:xfrm>
+          <a:off x="0" y="0"/>
+          <a:ext cx="0" cy="0"/>
+          <a:chOff x="0" y="0"/>
+          <a:chExt cx="0" cy="0"/>
+        </a:xfrm>
+      </p:grpSpPr>
+      <p:sp>
+        <p:nvSpPr>
+          <p:cNvPr id="2" name="Title 1">
+            <a:extLst>
+              <a:ext uri="{FF2B5EF4-FFF2-40B4-BE49-F238E27FC236}">
+                <a16:creationId xmlns:a16="http://schemas.microsoft.com/office/drawing/2014/main" id="{1D6D203C-F0FE-2F99-C637-33434AED7C3C}"/>
+              </a:ext>
+            </a:extLst>
+          </p:cNvPr>
+          <p:cNvSpPr>
+            <a:spLocks noGrp="1"/>
+          </p:cNvSpPr>
+          <p:nvPr>
+            <p:ph type="ctrTitle"/>
+          </p:nvPr>
+        </p:nvSpPr>
+        <p:spPr/>
+        <p:txBody>
+          <a:bodyPr/>
+          <a:lstStyle/>
+          <a:p>
+            <a:r>
+              <a:rPr lang="en-US" dirty="0"/>
+              <a:t>Paper contribution</a:t>
+            </a:r>
+            <a:endParaRPr lang="en-IL" dirty="0"/>
+          </a:p>
+        </p:txBody>
+      </p:sp>
+      <p:sp>
+        <p:nvSpPr>
+          <p:cNvPr id="3" name="Subtitle 2">
+            <a:extLst>
+              <a:ext uri="{FF2B5EF4-FFF2-40B4-BE49-F238E27FC236}">
+                <a16:creationId xmlns:a16="http://schemas.microsoft.com/office/drawing/2014/main" id="{D17A89F5-0CB8-A06D-BDB0-47650C498088}"/>
+              </a:ext>
+            </a:extLst>
+          </p:cNvPr>
+          <p:cNvSpPr>
+            <a:spLocks noGrp="1"/>
+          </p:cNvSpPr>
+          <p:nvPr>
+            <p:ph type="subTitle" idx="1"/>
+          </p:nvPr>
+        </p:nvSpPr>
+        <p:spPr/>
+        <p:txBody>
+          <a:bodyPr/>
+          <a:lstStyle/>
+          <a:p>
+            <a:endParaRPr lang="en-IL"/>
+          </a:p>
+        </p:txBody>
+      </p:sp>
+    </p:spTree>
+    <p:extLst>
+      <p:ext uri="{BB962C8B-B14F-4D97-AF65-F5344CB8AC3E}">
+        <p14:creationId xmlns:p14="http://schemas.microsoft.com/office/powerpoint/2010/main" val="1061825000"/>
+      </p:ext>
+    </p:extLst>
+  </p:cSld>
+  <p:clrMapOvr>
+    <a:masterClrMapping/>
+  </p:clrMapOvr>
+</p:sld>
+</file>
+
+<file path=ppt/slides/slide34.xml><?xml version="1.0" encoding="utf-8"?>
+<p:sld xmlns:a="http://schemas.openxmlformats.org/drawingml/2006/main" xmlns:r="http://schemas.openxmlformats.org/officeDocument/2006/relationships" xmlns:p="http://schemas.openxmlformats.org/presentationml/2006/main">
+  <p:cSld>
+    <p:spTree>
+      <p:nvGrpSpPr>
+        <p:cNvPr id="1" name=""/>
+        <p:cNvGrpSpPr/>
+        <p:nvPr/>
+      </p:nvGrpSpPr>
+      <p:grpSpPr>
+        <a:xfrm>
+          <a:off x="0" y="0"/>
+          <a:ext cx="0" cy="0"/>
+          <a:chOff x="0" y="0"/>
+          <a:chExt cx="0" cy="0"/>
+        </a:xfrm>
+      </p:grpSpPr>
+      <p:sp>
+        <p:nvSpPr>
+          <p:cNvPr id="2" name="Title 1">
+            <a:extLst>
+              <a:ext uri="{FF2B5EF4-FFF2-40B4-BE49-F238E27FC236}">
+                <a16:creationId xmlns:a16="http://schemas.microsoft.com/office/drawing/2014/main" id="{2D34C8EC-2CF4-B243-C0A9-63356A4BB1F6}"/>
+              </a:ext>
+            </a:extLst>
+          </p:cNvPr>
+          <p:cNvSpPr>
+            <a:spLocks noGrp="1"/>
+          </p:cNvSpPr>
+          <p:nvPr>
+            <p:ph type="title"/>
+          </p:nvPr>
+        </p:nvSpPr>
+        <p:spPr/>
+        <p:txBody>
+          <a:bodyPr/>
+          <a:lstStyle/>
+          <a:p>
+            <a:r>
+              <a:rPr lang="en-US" dirty="0"/>
+              <a:t>Paper contribution</a:t>
+            </a:r>
+            <a:endParaRPr lang="en-IL" dirty="0"/>
+          </a:p>
+        </p:txBody>
+      </p:sp>
+      <p:sp>
+        <p:nvSpPr>
+          <p:cNvPr id="3" name="Content Placeholder 2">
+            <a:extLst>
+              <a:ext uri="{FF2B5EF4-FFF2-40B4-BE49-F238E27FC236}">
+                <a16:creationId xmlns:a16="http://schemas.microsoft.com/office/drawing/2014/main" id="{7C82912D-860C-B0F7-DEB2-D52C78E33151}"/>
+              </a:ext>
+            </a:extLst>
+          </p:cNvPr>
+          <p:cNvSpPr>
+            <a:spLocks noGrp="1"/>
+          </p:cNvSpPr>
+          <p:nvPr>
+            <p:ph idx="1"/>
+          </p:nvPr>
+        </p:nvSpPr>
+        <p:spPr/>
+        <p:txBody>
+          <a:bodyPr/>
+          <a:lstStyle/>
+          <a:p>
+            <a:r>
+              <a:rPr lang="en-US" dirty="0"/>
+              <a:t>The paper focuses on a (nonconvex) Wasserstein ambiguity set containing only normal distributions.</a:t>
+            </a:r>
+            <a:br>
+              <a:rPr lang="en-US" dirty="0"/>
+            </a:br>
+            <a:endParaRPr lang="en-US" dirty="0"/>
+          </a:p>
+          <a:p>
+            <a:r>
+              <a:rPr lang="en-US" dirty="0"/>
+              <a:t>Shows that the optimal estimator and the least favorable distribution form a Nash equilibrium.</a:t>
+            </a:r>
+            <a:br>
+              <a:rPr lang="en-US" dirty="0"/>
+            </a:br>
+            <a:r>
+              <a:rPr lang="en-US" dirty="0"/>
+              <a:t> </a:t>
+            </a:r>
+          </a:p>
+          <a:p>
+            <a:r>
+              <a:rPr lang="en-US" dirty="0"/>
+              <a:t>Proves that the estimation problem is equivalent to a tractable convex program. Devises a Frank-Wolfe algorithm for this convex program.</a:t>
+            </a:r>
+            <a:br>
+              <a:rPr lang="en-US" dirty="0"/>
+            </a:br>
+            <a:endParaRPr lang="en-US" dirty="0"/>
+          </a:p>
+        </p:txBody>
+      </p:sp>
+    </p:spTree>
+    <p:extLst>
+      <p:ext uri="{BB962C8B-B14F-4D97-AF65-F5344CB8AC3E}">
+        <p14:creationId xmlns:p14="http://schemas.microsoft.com/office/powerpoint/2010/main" val="1759521789"/>
+      </p:ext>
+    </p:extLst>
+  </p:cSld>
+  <p:clrMapOvr>
+    <a:masterClrMapping/>
+  </p:clrMapOvr>
+</p:sld>
+</file>
+
+<file path=ppt/slides/slide35.xml><?xml version="1.0" encoding="utf-8"?>
+<p:sld xmlns:a="http://schemas.openxmlformats.org/drawingml/2006/main" xmlns:r="http://schemas.openxmlformats.org/officeDocument/2006/relationships" xmlns:p="http://schemas.openxmlformats.org/presentationml/2006/main">
+  <p:cSld>
+    <p:spTree>
+      <p:nvGrpSpPr>
+        <p:cNvPr id="1" name=""/>
+        <p:cNvGrpSpPr/>
+        <p:nvPr/>
+      </p:nvGrpSpPr>
+      <p:grpSpPr>
+        <a:xfrm>
+          <a:off x="0" y="0"/>
+          <a:ext cx="0" cy="0"/>
+          <a:chOff x="0" y="0"/>
+          <a:chExt cx="0" cy="0"/>
+        </a:xfrm>
+      </p:grpSpPr>
+      <p:sp>
+        <p:nvSpPr>
+          <p:cNvPr id="2" name="Title 1">
+            <a:extLst>
+              <a:ext uri="{FF2B5EF4-FFF2-40B4-BE49-F238E27FC236}">
+                <a16:creationId xmlns:a16="http://schemas.microsoft.com/office/drawing/2014/main" id="{3FBDD0BE-5E37-ED35-1B56-DE41CC44E481}"/>
+              </a:ext>
+            </a:extLst>
+          </p:cNvPr>
+          <p:cNvSpPr>
+            <a:spLocks noGrp="1"/>
+          </p:cNvSpPr>
+          <p:nvPr>
+            <p:ph type="ctrTitle"/>
+          </p:nvPr>
+        </p:nvSpPr>
+        <p:spPr/>
+        <p:txBody>
+          <a:bodyPr/>
+          <a:lstStyle/>
+          <a:p>
+            <a:r>
+              <a:rPr lang="en-US" dirty="0"/>
+              <a:t>Assessment of strength and weakness</a:t>
+            </a:r>
+            <a:endParaRPr lang="en-IL" dirty="0"/>
+          </a:p>
+        </p:txBody>
+      </p:sp>
+      <p:sp>
+        <p:nvSpPr>
+          <p:cNvPr id="3" name="Subtitle 2">
+            <a:extLst>
+              <a:ext uri="{FF2B5EF4-FFF2-40B4-BE49-F238E27FC236}">
+                <a16:creationId xmlns:a16="http://schemas.microsoft.com/office/drawing/2014/main" id="{935D80D0-24DE-E978-8C08-365744683007}"/>
+              </a:ext>
+            </a:extLst>
+          </p:cNvPr>
+          <p:cNvSpPr>
+            <a:spLocks noGrp="1"/>
+          </p:cNvSpPr>
+          <p:nvPr>
+            <p:ph type="subTitle" idx="1"/>
+          </p:nvPr>
+        </p:nvSpPr>
+        <p:spPr/>
+        <p:txBody>
+          <a:bodyPr/>
+          <a:lstStyle/>
+          <a:p>
+            <a:endParaRPr lang="en-IL" dirty="0"/>
+          </a:p>
+        </p:txBody>
+      </p:sp>
+    </p:spTree>
+    <p:extLst>
+      <p:ext uri="{BB962C8B-B14F-4D97-AF65-F5344CB8AC3E}">
+        <p14:creationId xmlns:p14="http://schemas.microsoft.com/office/powerpoint/2010/main" val="2128959162"/>
+      </p:ext>
+    </p:extLst>
+  </p:cSld>
+  <p:clrMapOvr>
+    <a:masterClrMapping/>
+  </p:clrMapOvr>
+</p:sld>
+</file>
+
+<file path=ppt/slides/slide36.xml><?xml version="1.0" encoding="utf-8"?>
+<p:sld xmlns:a="http://schemas.openxmlformats.org/drawingml/2006/main" xmlns:r="http://schemas.openxmlformats.org/officeDocument/2006/relationships" xmlns:p="http://schemas.openxmlformats.org/presentationml/2006/main">
+  <p:cSld>
+    <p:spTree>
+      <p:nvGrpSpPr>
+        <p:cNvPr id="1" name=""/>
+        <p:cNvGrpSpPr/>
+        <p:nvPr/>
+      </p:nvGrpSpPr>
+      <p:grpSpPr>
+        <a:xfrm>
+          <a:off x="0" y="0"/>
+          <a:ext cx="0" cy="0"/>
+          <a:chOff x="0" y="0"/>
+          <a:chExt cx="0" cy="0"/>
+        </a:xfrm>
+      </p:grpSpPr>
+      <p:sp>
+        <p:nvSpPr>
+          <p:cNvPr id="2" name="Title 1">
+            <a:extLst>
+              <a:ext uri="{FF2B5EF4-FFF2-40B4-BE49-F238E27FC236}">
+                <a16:creationId xmlns:a16="http://schemas.microsoft.com/office/drawing/2014/main" id="{0D399E5A-034E-8670-D4C0-3A3855429217}"/>
+              </a:ext>
+            </a:extLst>
+          </p:cNvPr>
+          <p:cNvSpPr>
+            <a:spLocks noGrp="1"/>
+          </p:cNvSpPr>
+          <p:nvPr>
+            <p:ph type="title"/>
+          </p:nvPr>
+        </p:nvSpPr>
+        <p:spPr/>
+        <p:txBody>
+          <a:bodyPr/>
+          <a:lstStyle/>
+          <a:p>
+            <a:r>
+              <a:rPr lang="en-US" dirty="0"/>
+              <a:t>Strength</a:t>
+            </a:r>
+            <a:endParaRPr lang="en-IL" dirty="0"/>
+          </a:p>
+        </p:txBody>
+      </p:sp>
+      <mc:AlternateContent xmlns:mc="http://schemas.openxmlformats.org/markup-compatibility/2006">
+        <mc:Choice xmlns:a14="http://schemas.microsoft.com/office/drawing/2010/main" Requires="a14">
+          <p:sp>
+            <p:nvSpPr>
+              <p:cNvPr id="3" name="Content Placeholder 2">
+                <a:extLst>
+                  <a:ext uri="{FF2B5EF4-FFF2-40B4-BE49-F238E27FC236}">
+                    <a16:creationId xmlns:a16="http://schemas.microsoft.com/office/drawing/2014/main" id="{C9CBF3A4-B06C-917B-A30E-2A0B97FD8EEA}"/>
+                  </a:ext>
+                </a:extLst>
+              </p:cNvPr>
+              <p:cNvSpPr>
+                <a:spLocks noGrp="1"/>
+              </p:cNvSpPr>
+              <p:nvPr>
+                <p:ph idx="1"/>
+              </p:nvPr>
+            </p:nvSpPr>
+            <p:spPr/>
+            <p:txBody>
+              <a:bodyPr/>
+              <a:lstStyle/>
+              <a:p>
+                <a:r>
+                  <a:rPr lang="en-US" dirty="0"/>
+                  <a:t>The paper solves gives an efficient way to solve the optimization problem.</a:t>
+                </a:r>
+              </a:p>
+              <a:p>
+                <a:endParaRPr lang="en-US" dirty="0"/>
+              </a:p>
+              <a:p>
+                <a:r>
+                  <a:rPr lang="en-US" dirty="0"/>
+                  <a:t>Given the solution, </a:t>
+                </a:r>
+                <a14:m>
+                  <m:oMath xmlns:m="http://schemas.openxmlformats.org/officeDocument/2006/math">
+                    <m:sSup>
+                      <m:sSupPr>
+                        <m:ctrlPr>
+                          <a:rPr lang="en-US" b="0" i="1" smtClean="0">
+                            <a:latin typeface="Cambria Math" panose="02040503050406030204" pitchFamily="18" charset="0"/>
+                          </a:rPr>
+                        </m:ctrlPr>
+                      </m:sSupPr>
+                      <m:e>
+                        <m:r>
+                          <a:rPr lang="en-US" b="0" i="1" smtClean="0">
+                            <a:latin typeface="Cambria Math" panose="02040503050406030204" pitchFamily="18" charset="0"/>
+                          </a:rPr>
+                          <m:t>𝑆</m:t>
+                        </m:r>
+                      </m:e>
+                      <m:sup>
+                        <m:r>
+                          <a:rPr lang="en-US" b="0" i="1" smtClean="0">
+                            <a:latin typeface="Cambria Math" panose="02040503050406030204" pitchFamily="18" charset="0"/>
+                          </a:rPr>
+                          <m:t>∗</m:t>
+                        </m:r>
+                      </m:sup>
+                    </m:sSup>
+                  </m:oMath>
+                </a14:m>
+                <a:r>
+                  <a:rPr lang="en-US" dirty="0"/>
+                  <a:t>, we know exactly the worst case distribution.</a:t>
+                </a:r>
+                <a:endParaRPr lang="en-IL" dirty="0"/>
+              </a:p>
+            </p:txBody>
+          </p:sp>
+        </mc:Choice>
+        <mc:Fallback>
+          <p:sp>
+            <p:nvSpPr>
+              <p:cNvPr id="3" name="Content Placeholder 2">
+                <a:extLst>
+                  <a:ext uri="{FF2B5EF4-FFF2-40B4-BE49-F238E27FC236}">
+                    <a16:creationId xmlns:a16="http://schemas.microsoft.com/office/drawing/2014/main" id="{C9CBF3A4-B06C-917B-A30E-2A0B97FD8EEA}"/>
+                  </a:ext>
+                </a:extLst>
+              </p:cNvPr>
+              <p:cNvSpPr>
+                <a:spLocks noGrp="1" noRot="1" noChangeAspect="1" noMove="1" noResize="1" noEditPoints="1" noAdjustHandles="1" noChangeArrowheads="1" noChangeShapeType="1" noTextEdit="1"/>
+              </p:cNvSpPr>
+              <p:nvPr>
+                <p:ph idx="1"/>
+              </p:nvPr>
+            </p:nvSpPr>
+            <p:spPr>
+              <a:blipFill>
+                <a:blip r:embed="rId2"/>
+                <a:stretch>
+                  <a:fillRect l="-1043" t="-2241"/>
+                </a:stretch>
+              </a:blipFill>
+            </p:spPr>
+            <p:txBody>
+              <a:bodyPr/>
+              <a:lstStyle/>
+              <a:p>
+                <a:r>
+                  <a:rPr lang="en-IL">
+                    <a:noFill/>
+                  </a:rPr>
+                  <a:t> </a:t>
+                </a:r>
+              </a:p>
+            </p:txBody>
+          </p:sp>
+        </mc:Fallback>
+      </mc:AlternateContent>
+    </p:spTree>
+    <p:extLst>
+      <p:ext uri="{BB962C8B-B14F-4D97-AF65-F5344CB8AC3E}">
+        <p14:creationId xmlns:p14="http://schemas.microsoft.com/office/powerpoint/2010/main" val="3658336090"/>
+      </p:ext>
+    </p:extLst>
+  </p:cSld>
+  <p:clrMapOvr>
+    <a:masterClrMapping/>
+  </p:clrMapOvr>
+</p:sld>
+</file>
+
+<file path=ppt/slides/slide37.xml><?xml version="1.0" encoding="utf-8"?>
+<p:sld xmlns:a="http://schemas.openxmlformats.org/drawingml/2006/main" xmlns:r="http://schemas.openxmlformats.org/officeDocument/2006/relationships" xmlns:p="http://schemas.openxmlformats.org/presentationml/2006/main">
+  <p:cSld>
+    <p:spTree>
+      <p:nvGrpSpPr>
+        <p:cNvPr id="1" name=""/>
+        <p:cNvGrpSpPr/>
+        <p:nvPr/>
+      </p:nvGrpSpPr>
+      <p:grpSpPr>
+        <a:xfrm>
+          <a:off x="0" y="0"/>
+          <a:ext cx="0" cy="0"/>
+          <a:chOff x="0" y="0"/>
+          <a:chExt cx="0" cy="0"/>
+        </a:xfrm>
+      </p:grpSpPr>
+      <p:sp>
+        <p:nvSpPr>
+          <p:cNvPr id="2" name="Title 1">
+            <a:extLst>
+              <a:ext uri="{FF2B5EF4-FFF2-40B4-BE49-F238E27FC236}">
+                <a16:creationId xmlns:a16="http://schemas.microsoft.com/office/drawing/2014/main" id="{CDA202A3-FAE2-DE27-A390-B0DCC0F66904}"/>
+              </a:ext>
+            </a:extLst>
+          </p:cNvPr>
+          <p:cNvSpPr>
+            <a:spLocks noGrp="1"/>
+          </p:cNvSpPr>
+          <p:nvPr>
+            <p:ph type="title"/>
+          </p:nvPr>
+        </p:nvSpPr>
+        <p:spPr/>
+        <p:txBody>
+          <a:bodyPr/>
+          <a:lstStyle/>
+          <a:p>
+            <a:r>
+              <a:rPr lang="en-US" dirty="0"/>
+              <a:t>Weakness</a:t>
+            </a:r>
+            <a:endParaRPr lang="en-IL" dirty="0"/>
+          </a:p>
+        </p:txBody>
+      </p:sp>
+      <p:sp>
+        <p:nvSpPr>
+          <p:cNvPr id="3" name="Content Placeholder 2">
+            <a:extLst>
+              <a:ext uri="{FF2B5EF4-FFF2-40B4-BE49-F238E27FC236}">
+                <a16:creationId xmlns:a16="http://schemas.microsoft.com/office/drawing/2014/main" id="{0BCC0DC2-8EC3-F219-83A7-F72EE6D28BF6}"/>
+              </a:ext>
+            </a:extLst>
+          </p:cNvPr>
+          <p:cNvSpPr>
+            <a:spLocks noGrp="1"/>
+          </p:cNvSpPr>
+          <p:nvPr>
+            <p:ph idx="1"/>
+          </p:nvPr>
+        </p:nvSpPr>
+        <p:spPr/>
+        <p:txBody>
+          <a:bodyPr/>
+          <a:lstStyle/>
+          <a:p>
+            <a:r>
+              <a:rPr lang="en-US" dirty="0"/>
+              <a:t>Only considers type-2 Wasserstein distance.</a:t>
+            </a:r>
+          </a:p>
+          <a:p>
+            <a:endParaRPr lang="en-US"/>
+          </a:p>
+          <a:p>
+            <a:endParaRPr lang="en-IL" dirty="0"/>
+          </a:p>
+        </p:txBody>
+      </p:sp>
+    </p:spTree>
+    <p:extLst>
+      <p:ext uri="{BB962C8B-B14F-4D97-AF65-F5344CB8AC3E}">
+        <p14:creationId xmlns:p14="http://schemas.microsoft.com/office/powerpoint/2010/main" val="2179102137"/>
       </p:ext>
     </p:extLst>
   </p:cSld>
@@ -16859,13 +17714,7 @@
                                 <a:rPr lang="en-US" b="0" i="1" smtClean="0">
                                   <a:latin typeface="Cambria Math" panose="02040503050406030204" pitchFamily="18" charset="0"/>
                                 </a:rPr>
-                                <m:t>−</m:t>
-                              </m:r>
-                              <m:r>
-                                <a:rPr lang="en-US" b="0" i="1" smtClean="0">
-                                  <a:latin typeface="Cambria Math" panose="02040503050406030204" pitchFamily="18" charset="0"/>
-                                </a:rPr>
-                                <m:t>2</m:t>
+                                <m:t>−2</m:t>
                               </m:r>
                               <m:sSup>
                                 <m:sSupPr>
@@ -16917,19 +17766,7 @@
                                             <a:rPr lang="en-US" b="0" i="1" smtClean="0">
                                               <a:latin typeface="Cambria Math" panose="02040503050406030204" pitchFamily="18" charset="0"/>
                                             </a:rPr>
-                                            <m:t>0</m:t>
-                                          </m:r>
-                                          <m:r>
-                                            <a:rPr lang="en-US" b="0" i="1" smtClean="0">
-                                              <a:latin typeface="Cambria Math" panose="02040503050406030204" pitchFamily="18" charset="0"/>
-                                            </a:rPr>
-                                            <m:t>.</m:t>
-                                          </m:r>
-                                          <m:r>
-                                            <a:rPr lang="en-US" b="0" i="1" smtClean="0">
-                                              <a:latin typeface="Cambria Math" panose="02040503050406030204" pitchFamily="18" charset="0"/>
-                                            </a:rPr>
-                                            <m:t>5</m:t>
+                                            <m:t>0.5</m:t>
                                           </m:r>
                                         </m:sup>
                                       </m:sSubSup>
@@ -16993,19 +17830,7 @@
                                             <a:rPr lang="en-US" i="1">
                                               <a:latin typeface="Cambria Math" panose="02040503050406030204" pitchFamily="18" charset="0"/>
                                             </a:rPr>
-                                            <m:t>0</m:t>
-                                          </m:r>
-                                          <m:r>
-                                            <a:rPr lang="en-US" i="1">
-                                              <a:latin typeface="Cambria Math" panose="02040503050406030204" pitchFamily="18" charset="0"/>
-                                            </a:rPr>
-                                            <m:t>.</m:t>
-                                          </m:r>
-                                          <m:r>
-                                            <a:rPr lang="en-US" i="1">
-                                              <a:latin typeface="Cambria Math" panose="02040503050406030204" pitchFamily="18" charset="0"/>
-                                            </a:rPr>
-                                            <m:t>5</m:t>
+                                            <m:t>0.5</m:t>
                                           </m:r>
                                         </m:sup>
                                       </m:sSubSup>
@@ -17017,19 +17842,7 @@
                                     <a:rPr lang="en-US" b="0" i="1" smtClean="0">
                                       <a:latin typeface="Cambria Math" panose="02040503050406030204" pitchFamily="18" charset="0"/>
                                     </a:rPr>
-                                    <m:t>0</m:t>
-                                  </m:r>
-                                  <m:r>
-                                    <a:rPr lang="en-US" b="0" i="1" smtClean="0">
-                                      <a:latin typeface="Cambria Math" panose="02040503050406030204" pitchFamily="18" charset="0"/>
-                                    </a:rPr>
-                                    <m:t>.</m:t>
-                                  </m:r>
-                                  <m:r>
-                                    <a:rPr lang="en-US" b="0" i="1" smtClean="0">
-                                      <a:latin typeface="Cambria Math" panose="02040503050406030204" pitchFamily="18" charset="0"/>
-                                    </a:rPr>
-                                    <m:t>5</m:t>
+                                    <m:t>0.5</m:t>
                                   </m:r>
                                 </m:sup>
                               </m:sSup>
@@ -18330,13 +19143,7 @@
                       <a:rPr lang="en-US" b="0" i="1" smtClean="0">
                         <a:latin typeface="Cambria Math" panose="02040503050406030204" pitchFamily="18" charset="0"/>
                       </a:rPr>
-                      <m:t>&gt;</m:t>
-                    </m:r>
-                    <m:r>
-                      <a:rPr lang="en-US" b="0" i="1" smtClean="0">
-                        <a:latin typeface="Cambria Math" panose="02040503050406030204" pitchFamily="18" charset="0"/>
-                      </a:rPr>
-                      <m:t>0</m:t>
+                      <m:t>&gt;0</m:t>
                     </m:r>
                   </m:oMath>
                 </a14:m>
@@ -18492,13 +19299,7 @@
                                     <a:rPr lang="en-US" i="1">
                                       <a:latin typeface="Cambria Math" panose="02040503050406030204" pitchFamily="18" charset="0"/>
                                     </a:rPr>
-                                    <m:t>−</m:t>
-                                  </m:r>
-                                  <m:r>
-                                    <a:rPr lang="en-US" i="1">
-                                      <a:latin typeface="Cambria Math" panose="02040503050406030204" pitchFamily="18" charset="0"/>
-                                    </a:rPr>
-                                    <m:t>1</m:t>
+                                    <m:t>−1</m:t>
                                   </m:r>
                                 </m:sup>
                               </m:sSubSup>
@@ -19019,13 +19820,7 @@
                             <a:rPr lang="en-US" i="1">
                               <a:latin typeface="Cambria Math" panose="02040503050406030204" pitchFamily="18" charset="0"/>
                             </a:rPr>
-                            <m:t>−</m:t>
-                          </m:r>
-                          <m:r>
-                            <a:rPr lang="en-US" i="1">
-                              <a:latin typeface="Cambria Math" panose="02040503050406030204" pitchFamily="18" charset="0"/>
-                            </a:rPr>
-                            <m:t>2</m:t>
+                            <m:t>−2</m:t>
                           </m:r>
                           <m:sSup>
                             <m:sSupPr>
@@ -19069,19 +19864,7 @@
                                         <a:rPr lang="en-US" i="1">
                                           <a:latin typeface="Cambria Math" panose="02040503050406030204" pitchFamily="18" charset="0"/>
                                         </a:rPr>
-                                        <m:t>0</m:t>
-                                      </m:r>
-                                      <m:r>
-                                        <a:rPr lang="en-US" i="1">
-                                          <a:latin typeface="Cambria Math" panose="02040503050406030204" pitchFamily="18" charset="0"/>
-                                        </a:rPr>
-                                        <m:t>.</m:t>
-                                      </m:r>
-                                      <m:r>
-                                        <a:rPr lang="en-US" i="1">
-                                          <a:latin typeface="Cambria Math" panose="02040503050406030204" pitchFamily="18" charset="0"/>
-                                        </a:rPr>
-                                        <m:t>5</m:t>
+                                        <m:t>0.5</m:t>
                                       </m:r>
                                     </m:sup>
                                   </m:sSup>
@@ -19115,19 +19898,7 @@
                                         <a:rPr lang="en-US" i="1">
                                           <a:latin typeface="Cambria Math" panose="02040503050406030204" pitchFamily="18" charset="0"/>
                                         </a:rPr>
-                                        <m:t>0</m:t>
-                                      </m:r>
-                                      <m:r>
-                                        <a:rPr lang="en-US" i="1">
-                                          <a:latin typeface="Cambria Math" panose="02040503050406030204" pitchFamily="18" charset="0"/>
-                                        </a:rPr>
-                                        <m:t>.</m:t>
-                                      </m:r>
-                                      <m:r>
-                                        <a:rPr lang="en-US" i="1">
-                                          <a:latin typeface="Cambria Math" panose="02040503050406030204" pitchFamily="18" charset="0"/>
-                                        </a:rPr>
-                                        <m:t>5</m:t>
+                                        <m:t>0.5</m:t>
                                       </m:r>
                                     </m:sup>
                                   </m:sSup>
@@ -19139,19 +19910,7 @@
                                 <a:rPr lang="en-US" i="1">
                                   <a:latin typeface="Cambria Math" panose="02040503050406030204" pitchFamily="18" charset="0"/>
                                 </a:rPr>
-                                <m:t>0</m:t>
-                              </m:r>
-                              <m:r>
-                                <a:rPr lang="en-US" i="1">
-                                  <a:latin typeface="Cambria Math" panose="02040503050406030204" pitchFamily="18" charset="0"/>
-                                </a:rPr>
-                                <m:t>.</m:t>
-                              </m:r>
-                              <m:r>
-                                <a:rPr lang="en-US" i="1">
-                                  <a:latin typeface="Cambria Math" panose="02040503050406030204" pitchFamily="18" charset="0"/>
-                                </a:rPr>
-                                <m:t>5</m:t>
+                                <m:t>0.5</m:t>
                               </m:r>
                             </m:sup>
                           </m:sSup>

</xml_diff>